<commit_message>
Added roll number and name
</commit_message>
<xml_diff>
--- a/shivam_Nerwal_1900290140033.pptx
+++ b/shivam_Nerwal_1900290140033.pptx
@@ -1292,7 +1292,7 @@
           <a:p>
             <a:fld id="{EA6908BC-8BDA-45B1-A1AE-07940C6F7691}" type="datetimeFigureOut">
               <a:rPr lang="en-IN" smtClean="0"/>
-              <a:t>26-05-2022</a:t>
+              <a:t>27-05-2022</a:t>
             </a:fld>
             <a:endParaRPr lang="en-IN"/>
           </a:p>
@@ -1563,7 +1563,7 @@
           <a:p>
             <a:fld id="{EA6908BC-8BDA-45B1-A1AE-07940C6F7691}" type="datetimeFigureOut">
               <a:rPr lang="en-IN" smtClean="0"/>
-              <a:t>26-05-2022</a:t>
+              <a:t>27-05-2022</a:t>
             </a:fld>
             <a:endParaRPr lang="en-IN"/>
           </a:p>
@@ -1752,7 +1752,7 @@
           <a:p>
             <a:fld id="{EA6908BC-8BDA-45B1-A1AE-07940C6F7691}" type="datetimeFigureOut">
               <a:rPr lang="en-IN" smtClean="0"/>
-              <a:t>26-05-2022</a:t>
+              <a:t>27-05-2022</a:t>
             </a:fld>
             <a:endParaRPr lang="en-IN"/>
           </a:p>
@@ -2020,7 +2020,7 @@
           <a:p>
             <a:fld id="{EA6908BC-8BDA-45B1-A1AE-07940C6F7691}" type="datetimeFigureOut">
               <a:rPr lang="en-IN" smtClean="0"/>
-              <a:t>26-05-2022</a:t>
+              <a:t>27-05-2022</a:t>
             </a:fld>
             <a:endParaRPr lang="en-IN"/>
           </a:p>
@@ -2348,7 +2348,7 @@
           <a:p>
             <a:fld id="{EA6908BC-8BDA-45B1-A1AE-07940C6F7691}" type="datetimeFigureOut">
               <a:rPr lang="en-IN" smtClean="0"/>
-              <a:t>26-05-2022</a:t>
+              <a:t>27-05-2022</a:t>
             </a:fld>
             <a:endParaRPr lang="en-IN"/>
           </a:p>
@@ -2966,7 +2966,7 @@
           <a:p>
             <a:fld id="{EA6908BC-8BDA-45B1-A1AE-07940C6F7691}" type="datetimeFigureOut">
               <a:rPr lang="en-IN" smtClean="0"/>
-              <a:t>26-05-2022</a:t>
+              <a:t>27-05-2022</a:t>
             </a:fld>
             <a:endParaRPr lang="en-IN"/>
           </a:p>
@@ -3824,7 +3824,7 @@
           <a:p>
             <a:fld id="{EA6908BC-8BDA-45B1-A1AE-07940C6F7691}" type="datetimeFigureOut">
               <a:rPr lang="en-IN" smtClean="0"/>
-              <a:t>26-05-2022</a:t>
+              <a:t>27-05-2022</a:t>
             </a:fld>
             <a:endParaRPr lang="en-IN"/>
           </a:p>
@@ -3989,7 +3989,7 @@
           <a:p>
             <a:fld id="{EA6908BC-8BDA-45B1-A1AE-07940C6F7691}" type="datetimeFigureOut">
               <a:rPr lang="en-IN" smtClean="0"/>
-              <a:t>26-05-2022</a:t>
+              <a:t>27-05-2022</a:t>
             </a:fld>
             <a:endParaRPr lang="en-IN"/>
           </a:p>
@@ -4164,7 +4164,7 @@
           <a:p>
             <a:fld id="{EA6908BC-8BDA-45B1-A1AE-07940C6F7691}" type="datetimeFigureOut">
               <a:rPr lang="en-IN" smtClean="0"/>
-              <a:t>26-05-2022</a:t>
+              <a:t>27-05-2022</a:t>
             </a:fld>
             <a:endParaRPr lang="en-IN"/>
           </a:p>
@@ -4329,7 +4329,7 @@
           <a:p>
             <a:fld id="{EA6908BC-8BDA-45B1-A1AE-07940C6F7691}" type="datetimeFigureOut">
               <a:rPr lang="en-IN" smtClean="0"/>
-              <a:t>26-05-2022</a:t>
+              <a:t>27-05-2022</a:t>
             </a:fld>
             <a:endParaRPr lang="en-IN"/>
           </a:p>
@@ -4571,7 +4571,7 @@
           <a:p>
             <a:fld id="{EA6908BC-8BDA-45B1-A1AE-07940C6F7691}" type="datetimeFigureOut">
               <a:rPr lang="en-IN" smtClean="0"/>
-              <a:t>26-05-2022</a:t>
+              <a:t>27-05-2022</a:t>
             </a:fld>
             <a:endParaRPr lang="en-IN"/>
           </a:p>
@@ -4858,7 +4858,7 @@
           <a:p>
             <a:fld id="{EA6908BC-8BDA-45B1-A1AE-07940C6F7691}" type="datetimeFigureOut">
               <a:rPr lang="en-IN" smtClean="0"/>
-              <a:t>26-05-2022</a:t>
+              <a:t>27-05-2022</a:t>
             </a:fld>
             <a:endParaRPr lang="en-IN"/>
           </a:p>
@@ -5293,7 +5293,7 @@
           <a:p>
             <a:fld id="{EA6908BC-8BDA-45B1-A1AE-07940C6F7691}" type="datetimeFigureOut">
               <a:rPr lang="en-IN" smtClean="0"/>
-              <a:t>26-05-2022</a:t>
+              <a:t>27-05-2022</a:t>
             </a:fld>
             <a:endParaRPr lang="en-IN"/>
           </a:p>
@@ -5406,7 +5406,7 @@
           <a:p>
             <a:fld id="{EA6908BC-8BDA-45B1-A1AE-07940C6F7691}" type="datetimeFigureOut">
               <a:rPr lang="en-IN" smtClean="0"/>
-              <a:t>26-05-2022</a:t>
+              <a:t>27-05-2022</a:t>
             </a:fld>
             <a:endParaRPr lang="en-IN"/>
           </a:p>
@@ -5496,7 +5496,7 @@
           <a:p>
             <a:fld id="{EA6908BC-8BDA-45B1-A1AE-07940C6F7691}" type="datetimeFigureOut">
               <a:rPr lang="en-IN" smtClean="0"/>
-              <a:t>26-05-2022</a:t>
+              <a:t>27-05-2022</a:t>
             </a:fld>
             <a:endParaRPr lang="en-IN"/>
           </a:p>
@@ -5770,7 +5770,7 @@
           <a:p>
             <a:fld id="{EA6908BC-8BDA-45B1-A1AE-07940C6F7691}" type="datetimeFigureOut">
               <a:rPr lang="en-IN" smtClean="0"/>
-              <a:t>26-05-2022</a:t>
+              <a:t>27-05-2022</a:t>
             </a:fld>
             <a:endParaRPr lang="en-IN"/>
           </a:p>
@@ -6041,7 +6041,7 @@
           <a:p>
             <a:fld id="{EA6908BC-8BDA-45B1-A1AE-07940C6F7691}" type="datetimeFigureOut">
               <a:rPr lang="en-IN" smtClean="0"/>
-              <a:t>26-05-2022</a:t>
+              <a:t>27-05-2022</a:t>
             </a:fld>
             <a:endParaRPr lang="en-IN"/>
           </a:p>
@@ -6455,7 +6455,7 @@
           <a:p>
             <a:fld id="{EA6908BC-8BDA-45B1-A1AE-07940C6F7691}" type="datetimeFigureOut">
               <a:rPr lang="en-IN" smtClean="0"/>
-              <a:t>26-05-2022</a:t>
+              <a:t>27-05-2022</a:t>
             </a:fld>
             <a:endParaRPr lang="en-IN"/>
           </a:p>
@@ -6987,7 +6987,7 @@
         <p:spPr>
           <a:xfrm>
             <a:off x="3143955" y="3413851"/>
-            <a:ext cx="5904089" cy="2062103"/>
+            <a:ext cx="5904089" cy="3539430"/>
           </a:xfrm>
           <a:prstGeom prst="rect">
             <a:avLst/>
@@ -7022,6 +7022,33 @@
                 <a:latin typeface="Bahnschrift SemiBold" panose="020B0502040204020203" pitchFamily="34" charset="0"/>
               </a:rPr>
               <a:t>React ( type script )</a:t>
+            </a:r>
+            <a:br>
+              <a:rPr lang="en-US" sz="3200" b="1" u="sng" dirty="0">
+                <a:latin typeface="Bahnschrift SemiBold" panose="020B0502040204020203" pitchFamily="34" charset="0"/>
+              </a:rPr>
+            </a:br>
+            <a:br>
+              <a:rPr lang="en-US" sz="3200" b="1" u="sng" dirty="0">
+                <a:latin typeface="Bahnschrift SemiBold" panose="020B0502040204020203" pitchFamily="34" charset="0"/>
+              </a:rPr>
+            </a:br>
+            <a:r>
+              <a:rPr lang="en-US" sz="3200" b="1" dirty="0">
+                <a:latin typeface="Bahnschrift SemiBold" panose="020B0502040204020203" pitchFamily="34" charset="0"/>
+              </a:rPr>
+              <a:t>      Name : Shivam Nerwal</a:t>
+            </a:r>
+            <a:br>
+              <a:rPr lang="en-US" sz="3200" b="1" dirty="0">
+                <a:latin typeface="Bahnschrift SemiBold" panose="020B0502040204020203" pitchFamily="34" charset="0"/>
+              </a:rPr>
+            </a:br>
+            <a:r>
+              <a:rPr lang="en-US" sz="3200" b="1" dirty="0">
+                <a:latin typeface="Bahnschrift SemiBold" panose="020B0502040204020203" pitchFamily="34" charset="0"/>
+              </a:rPr>
+              <a:t>     Roll No : 1900290140033</a:t>
             </a:r>
             <a:br>
               <a:rPr lang="en-US" sz="3200" b="1" u="sng" dirty="0">

</xml_diff>